<commit_message>
RaspberryPI dir + fix documentatoin
RaspberryPI dir + fix documentatoin.
IMU add .2 floating point value
</commit_message>
<xml_diff>
--- a/ProjectDocuments/Poster.pptx
+++ b/ProjectDocuments/Poster.pptx
@@ -243,7 +243,7 @@
           <a:p>
             <a:fld id="{EBC92114-2DE2-4DBD-88F5-EC34E326FC88}" type="datetimeFigureOut">
               <a:rPr lang="he-IL" smtClean="0"/>
-              <a:t>כ"ג/אדר א/תשפ"ד</a:t>
+              <a:t>ל'/אדר א/תשפ"ד</a:t>
             </a:fld>
             <a:endParaRPr lang="he-IL"/>
           </a:p>
@@ -413,7 +413,7 @@
           <a:p>
             <a:fld id="{EBC92114-2DE2-4DBD-88F5-EC34E326FC88}" type="datetimeFigureOut">
               <a:rPr lang="he-IL" smtClean="0"/>
-              <a:t>כ"ג/אדר א/תשפ"ד</a:t>
+              <a:t>ל'/אדר א/תשפ"ד</a:t>
             </a:fld>
             <a:endParaRPr lang="he-IL"/>
           </a:p>
@@ -593,7 +593,7 @@
           <a:p>
             <a:fld id="{EBC92114-2DE2-4DBD-88F5-EC34E326FC88}" type="datetimeFigureOut">
               <a:rPr lang="he-IL" smtClean="0"/>
-              <a:t>כ"ג/אדר א/תשפ"ד</a:t>
+              <a:t>ל'/אדר א/תשפ"ד</a:t>
             </a:fld>
             <a:endParaRPr lang="he-IL"/>
           </a:p>
@@ -763,7 +763,7 @@
           <a:p>
             <a:fld id="{EBC92114-2DE2-4DBD-88F5-EC34E326FC88}" type="datetimeFigureOut">
               <a:rPr lang="he-IL" smtClean="0"/>
-              <a:t>כ"ג/אדר א/תשפ"ד</a:t>
+              <a:t>ל'/אדר א/תשפ"ד</a:t>
             </a:fld>
             <a:endParaRPr lang="he-IL"/>
           </a:p>
@@ -1007,7 +1007,7 @@
           <a:p>
             <a:fld id="{EBC92114-2DE2-4DBD-88F5-EC34E326FC88}" type="datetimeFigureOut">
               <a:rPr lang="he-IL" smtClean="0"/>
-              <a:t>כ"ג/אדר א/תשפ"ד</a:t>
+              <a:t>ל'/אדר א/תשפ"ד</a:t>
             </a:fld>
             <a:endParaRPr lang="he-IL"/>
           </a:p>
@@ -1239,7 +1239,7 @@
           <a:p>
             <a:fld id="{EBC92114-2DE2-4DBD-88F5-EC34E326FC88}" type="datetimeFigureOut">
               <a:rPr lang="he-IL" smtClean="0"/>
-              <a:t>כ"ג/אדר א/תשפ"ד</a:t>
+              <a:t>ל'/אדר א/תשפ"ד</a:t>
             </a:fld>
             <a:endParaRPr lang="he-IL"/>
           </a:p>
@@ -1606,7 +1606,7 @@
           <a:p>
             <a:fld id="{EBC92114-2DE2-4DBD-88F5-EC34E326FC88}" type="datetimeFigureOut">
               <a:rPr lang="he-IL" smtClean="0"/>
-              <a:t>כ"ג/אדר א/תשפ"ד</a:t>
+              <a:t>ל'/אדר א/תשפ"ד</a:t>
             </a:fld>
             <a:endParaRPr lang="he-IL"/>
           </a:p>
@@ -1724,7 +1724,7 @@
           <a:p>
             <a:fld id="{EBC92114-2DE2-4DBD-88F5-EC34E326FC88}" type="datetimeFigureOut">
               <a:rPr lang="he-IL" smtClean="0"/>
-              <a:t>כ"ג/אדר א/תשפ"ד</a:t>
+              <a:t>ל'/אדר א/תשפ"ד</a:t>
             </a:fld>
             <a:endParaRPr lang="he-IL"/>
           </a:p>
@@ -1819,7 +1819,7 @@
           <a:p>
             <a:fld id="{EBC92114-2DE2-4DBD-88F5-EC34E326FC88}" type="datetimeFigureOut">
               <a:rPr lang="he-IL" smtClean="0"/>
-              <a:t>כ"ג/אדר א/תשפ"ד</a:t>
+              <a:t>ל'/אדר א/תשפ"ד</a:t>
             </a:fld>
             <a:endParaRPr lang="he-IL"/>
           </a:p>
@@ -2096,7 +2096,7 @@
           <a:p>
             <a:fld id="{EBC92114-2DE2-4DBD-88F5-EC34E326FC88}" type="datetimeFigureOut">
               <a:rPr lang="he-IL" smtClean="0"/>
-              <a:t>כ"ג/אדר א/תשפ"ד</a:t>
+              <a:t>ל'/אדר א/תשפ"ד</a:t>
             </a:fld>
             <a:endParaRPr lang="he-IL"/>
           </a:p>
@@ -2353,7 +2353,7 @@
           <a:p>
             <a:fld id="{EBC92114-2DE2-4DBD-88F5-EC34E326FC88}" type="datetimeFigureOut">
               <a:rPr lang="he-IL" smtClean="0"/>
-              <a:t>כ"ג/אדר א/תשפ"ד</a:t>
+              <a:t>ל'/אדר א/תשפ"ד</a:t>
             </a:fld>
             <a:endParaRPr lang="he-IL"/>
           </a:p>
@@ -2566,7 +2566,7 @@
           <a:p>
             <a:fld id="{EBC92114-2DE2-4DBD-88F5-EC34E326FC88}" type="datetimeFigureOut">
               <a:rPr lang="he-IL" smtClean="0"/>
-              <a:t>כ"ג/אדר א/תשפ"ד</a:t>
+              <a:t>ל'/אדר א/תשפ"ד</a:t>
             </a:fld>
             <a:endParaRPr lang="he-IL"/>
           </a:p>
@@ -2980,7 +2980,7 @@
           <p:nvPr>
             <p:extLst>
               <p:ext uri="{D42A27DB-BD31-4B8C-83A1-F6EECF244321}">
-                <p14:modId xmlns:p14="http://schemas.microsoft.com/office/powerpoint/2010/main" val="4004179884"/>
+                <p14:modId xmlns:p14="http://schemas.microsoft.com/office/powerpoint/2010/main" val="3009851935"/>
               </p:ext>
             </p:extLst>
           </p:nvPr>
@@ -3878,7 +3878,19 @@
                           <a:ea typeface="+mn-ea"/>
                           <a:cs typeface="Open Sans Hebrew" panose="00000500000000000000" pitchFamily="2" charset="-79"/>
                         </a:rPr>
-                        <a:t> for user usage, As an example one of the results below captures the temperature readings from an 8x8 grid of the AMG8833 thermal camera(One of the required sensors for the infrastructure).</a:t>
+                        <a:t> for user usage, As an example </a:t>
+                      </a:r>
+                      <a:r>
+                        <a:rPr lang="en-US" sz="3200" kern="1200" baseline="0" dirty="0" smtClean="0">
+                          <a:solidFill>
+                            <a:schemeClr val="tx1"/>
+                          </a:solidFill>
+                          <a:effectLst/>
+                          <a:latin typeface="+mn-lt"/>
+                          <a:ea typeface="+mn-ea"/>
+                          <a:cs typeface="Open Sans Hebrew" panose="00000500000000000000" pitchFamily="2" charset="-79"/>
+                        </a:rPr>
+                        <a:t>we’ve leveraged interpolation to enhance the resolution of temperature readings from an 8x8 grid to a 256x256 matrix using the AMG8833 thermal camera. This technique is demonstrated in the image, where hand was placed in front of the sensor to test the camera's ability to detect and visualize the heat signature at a higher resolution.</a:t>
                       </a:r>
                       <a:endParaRPr lang="en-US" sz="3200" kern="1200" dirty="0" smtClean="0">
                         <a:solidFill>
@@ -4552,13 +4564,7 @@
               <a:rPr lang="en-US" sz="4800" dirty="0" smtClean="0">
                 <a:cs typeface="Open Sans Hebrew" panose="00000500000000000000" pitchFamily="2" charset="-79"/>
               </a:rPr>
-              <a:t>Y</a:t>
-            </a:r>
-            <a:r>
-              <a:rPr lang="en-US" sz="4800" dirty="0" smtClean="0">
-                <a:cs typeface="Open Sans Hebrew" panose="00000500000000000000" pitchFamily="2" charset="-79"/>
-              </a:rPr>
-              <a:t>onatan Amir, Yuri </a:t>
+              <a:t>Yonatan Amir, Yuri </a:t>
             </a:r>
             <a:r>
               <a:rPr lang="en-US" sz="4800" dirty="0" err="1" smtClean="0">
@@ -4782,28 +4788,22 @@
       </p:pic>
       <p:pic>
         <p:nvPicPr>
-          <p:cNvPr id="10" name="תמונה 9"/>
+          <p:cNvPr id="5" name="תמונה 4"/>
           <p:cNvPicPr>
             <a:picLocks noChangeAspect="1"/>
           </p:cNvPicPr>
           <p:nvPr/>
         </p:nvPicPr>
         <p:blipFill>
-          <a:blip r:embed="rId6">
-            <a:extLst>
-              <a:ext uri="{28A0092B-C50C-407E-A947-70E740481C1C}">
-                <a14:useLocalDpi xmlns:a14="http://schemas.microsoft.com/office/drawing/2010/main" val="0"/>
-              </a:ext>
-            </a:extLst>
-          </a:blip>
+          <a:blip r:embed="rId6"/>
           <a:stretch>
             <a:fillRect/>
           </a:stretch>
         </p:blipFill>
         <p:spPr>
           <a:xfrm>
-            <a:off x="12042389" y="16038642"/>
-            <a:ext cx="12189211" cy="7835922"/>
+            <a:off x="12323402" y="18676121"/>
+            <a:ext cx="6546489" cy="5583172"/>
           </a:xfrm>
           <a:prstGeom prst="rect">
             <a:avLst/>

</xml_diff>